<commit_message>
motivacao e obj prontos
</commit_message>
<xml_diff>
--- a/apresentacao/ApresentacaoTRUE.pptx
+++ b/apresentacao/ApresentacaoTRUE.pptx
@@ -5,7 +5,7 @@
     <p:sldMasterId id="2147483855" r:id="rId1"/>
   </p:sldMasterIdLst>
   <p:notesMasterIdLst>
-    <p:notesMasterId r:id="rId8"/>
+    <p:notesMasterId r:id="rId11"/>
   </p:notesMasterIdLst>
   <p:sldIdLst>
     <p:sldId id="256" r:id="rId2"/>
@@ -14,6 +14,9 @@
     <p:sldId id="260" r:id="rId5"/>
     <p:sldId id="261" r:id="rId6"/>
     <p:sldId id="262" r:id="rId7"/>
+    <p:sldId id="263" r:id="rId8"/>
+    <p:sldId id="264" r:id="rId9"/>
+    <p:sldId id="265" r:id="rId10"/>
   </p:sldIdLst>
   <p:sldSz cx="9144000" cy="6858000" type="screen4x3"/>
   <p:notesSz cx="6858000" cy="9144000"/>
@@ -5134,11 +5137,7 @@
             <a:pPr algn="l"/>
             <a:r>
               <a:rPr lang="pt-BR" sz="3600" dirty="0" smtClean="0"/>
-              <a:t>TRUE: um sistema para rastreamento, localiza</a:t>
-            </a:r>
-            <a:r>
-              <a:rPr lang="pt-BR" sz="3600" dirty="0" smtClean="0"/>
-              <a:t>ção e identificação de usuários em ambientes inteligentes</a:t>
+              <a:t>TRUE: um sistema para rastreamento, localização e identificação de usuários em ambientes inteligentes</a:t>
             </a:r>
             <a:endParaRPr lang="pt-BR" sz="3600" dirty="0"/>
           </a:p>
@@ -5168,11 +5167,7 @@
           <a:p>
             <a:r>
               <a:rPr lang="pt-BR" dirty="0" smtClean="0"/>
-              <a:t>Danilo </a:t>
-            </a:r>
-            <a:r>
-              <a:rPr lang="pt-BR" dirty="0" smtClean="0"/>
-              <a:t>Ávila Monte </a:t>
+              <a:t>Danilo Ávila Monte </a:t>
             </a:r>
             <a:r>
               <a:rPr lang="pt-BR" dirty="0" err="1" smtClean="0"/>
@@ -5302,11 +5297,7 @@
           <a:p>
             <a:r>
               <a:rPr lang="pt-BR" dirty="0" smtClean="0"/>
-              <a:t>Motiva</a:t>
-            </a:r>
-            <a:r>
-              <a:rPr lang="pt-BR" dirty="0" smtClean="0"/>
-              <a:t>ção</a:t>
+              <a:t>Motivação</a:t>
             </a:r>
           </a:p>
           <a:p>
@@ -5495,33 +5486,7 @@
                   </a:outerShdw>
                 </a:effectLst>
               </a:rPr>
-              <a:t>Motiva</a:t>
-            </a:r>
-            <a:r>
-              <a:rPr lang="pt-BR" sz="2800" b="1" dirty="0" smtClean="0">
-                <a:ln w="12700">
-                  <a:solidFill>
-                    <a:schemeClr val="tx2">
-                      <a:satMod val="155000"/>
-                    </a:schemeClr>
-                  </a:solidFill>
-                  <a:prstDash val="solid"/>
-                </a:ln>
-                <a:solidFill>
-                  <a:schemeClr val="bg2">
-                    <a:tint val="85000"/>
-                    <a:satMod val="155000"/>
-                  </a:schemeClr>
-                </a:solidFill>
-                <a:effectLst>
-                  <a:outerShdw blurRad="41275" dist="20320" dir="1800000" algn="tl" rotWithShape="0">
-                    <a:srgbClr val="000000">
-                      <a:alpha val="40000"/>
-                    </a:srgbClr>
-                  </a:outerShdw>
-                </a:effectLst>
-              </a:rPr>
-              <a:t>ção</a:t>
+              <a:t>Motivação</a:t>
             </a:r>
             <a:endParaRPr lang="pt-BR" sz="2800" b="1" dirty="0">
               <a:ln w="12700">
@@ -5608,11 +5573,7 @@
           <a:p>
             <a:r>
               <a:rPr lang="en-US" dirty="0" err="1" smtClean="0"/>
-              <a:t>Computa</a:t>
-            </a:r>
-            <a:r>
-              <a:rPr lang="en-US" dirty="0" err="1" smtClean="0"/>
-              <a:t>ção</a:t>
+              <a:t>Computação</a:t>
             </a:r>
             <a:r>
               <a:rPr lang="en-US" dirty="0" smtClean="0"/>
@@ -5951,17 +5912,7 @@
                   </a:schemeClr>
                 </a:solidFill>
               </a:rPr>
-              <a:t>Aplica</a:t>
-            </a:r>
-            <a:r>
-              <a:rPr lang="pt-BR" dirty="0" smtClean="0">
-                <a:solidFill>
-                  <a:schemeClr val="bg1">
-                    <a:lumMod val="95000"/>
-                  </a:schemeClr>
-                </a:solidFill>
-              </a:rPr>
-              <a:t>ções</a:t>
+              <a:t>Aplicações</a:t>
             </a:r>
             <a:endParaRPr lang="pt-BR" dirty="0">
               <a:solidFill>
@@ -6298,6 +6249,36 @@
           <a:chExt cx="0" cy="0"/>
         </a:xfrm>
       </p:grpSpPr>
+      <p:pic>
+        <p:nvPicPr>
+          <p:cNvPr id="6" name="Picture 5" descr="smartRoom2.jpg"/>
+          <p:cNvPicPr>
+            <a:picLocks noChangeAspect="1"/>
+          </p:cNvPicPr>
+          <p:nvPr/>
+        </p:nvPicPr>
+        <p:blipFill>
+          <a:blip r:embed="rId2">
+            <a:extLst>
+              <a:ext uri="{28A0092B-C50C-407E-A947-70E740481C1C}">
+                <a14:useLocalDpi xmlns:a14="http://schemas.microsoft.com/office/drawing/2010/main" val="0"/>
+              </a:ext>
+            </a:extLst>
+          </a:blip>
+          <a:stretch>
+            <a:fillRect/>
+          </a:stretch>
+        </p:blipFill>
+        <p:spPr>
+          <a:xfrm>
+            <a:off x="195293" y="1371600"/>
+            <a:ext cx="8670396" cy="5202238"/>
+          </a:xfrm>
+          <a:prstGeom prst="rect">
+            <a:avLst/>
+          </a:prstGeom>
+        </p:spPr>
+      </p:pic>
       <p:sp>
         <p:nvSpPr>
           <p:cNvPr id="3" name="Content Placeholder 2"/>
@@ -6320,11 +6301,7 @@
           <a:p>
             <a:r>
               <a:rPr lang="en-US" dirty="0" err="1" smtClean="0"/>
-              <a:t>Informa</a:t>
-            </a:r>
-            <a:r>
-              <a:rPr lang="en-US" dirty="0" err="1" smtClean="0"/>
-              <a:t>ções</a:t>
+              <a:t>Informações</a:t>
             </a:r>
             <a:r>
               <a:rPr lang="en-US" dirty="0" smtClean="0"/>
@@ -6344,10 +6321,2352 @@
           </a:p>
         </p:txBody>
       </p:sp>
+      <p:sp>
+        <p:nvSpPr>
+          <p:cNvPr id="7" name="Rounded Rectangle 6"/>
+          <p:cNvSpPr/>
+          <p:nvPr/>
+        </p:nvSpPr>
+        <p:spPr>
+          <a:xfrm>
+            <a:off x="574758" y="1501853"/>
+            <a:ext cx="1715008" cy="472806"/>
+          </a:xfrm>
+          <a:prstGeom prst="roundRect">
+            <a:avLst/>
+          </a:prstGeom>
+        </p:spPr>
+        <p:style>
+          <a:lnRef idx="1">
+            <a:schemeClr val="accent1"/>
+          </a:lnRef>
+          <a:fillRef idx="3">
+            <a:schemeClr val="accent1"/>
+          </a:fillRef>
+          <a:effectRef idx="2">
+            <a:schemeClr val="accent1"/>
+          </a:effectRef>
+          <a:fontRef idx="minor">
+            <a:schemeClr val="lt1"/>
+          </a:fontRef>
+        </p:style>
+        <p:txBody>
+          <a:bodyPr rtlCol="0" anchor="ctr"/>
+          <a:lstStyle/>
+          <a:p>
+            <a:pPr algn="ctr"/>
+            <a:r>
+              <a:rPr lang="pt-BR" dirty="0" smtClean="0"/>
+              <a:t>Temperatura</a:t>
+            </a:r>
+            <a:endParaRPr lang="pt-BR" dirty="0"/>
+          </a:p>
+        </p:txBody>
+      </p:sp>
+      <p:sp>
+        <p:nvSpPr>
+          <p:cNvPr id="8" name="Rounded Rectangle 7"/>
+          <p:cNvSpPr/>
+          <p:nvPr/>
+        </p:nvSpPr>
+        <p:spPr>
+          <a:xfrm>
+            <a:off x="574758" y="2038418"/>
+            <a:ext cx="1715008" cy="472806"/>
+          </a:xfrm>
+          <a:prstGeom prst="roundRect">
+            <a:avLst/>
+          </a:prstGeom>
+        </p:spPr>
+        <p:style>
+          <a:lnRef idx="1">
+            <a:schemeClr val="accent1"/>
+          </a:lnRef>
+          <a:fillRef idx="3">
+            <a:schemeClr val="accent1"/>
+          </a:fillRef>
+          <a:effectRef idx="2">
+            <a:schemeClr val="accent1"/>
+          </a:effectRef>
+          <a:fontRef idx="minor">
+            <a:schemeClr val="lt1"/>
+          </a:fontRef>
+        </p:style>
+        <p:txBody>
+          <a:bodyPr rtlCol="0" anchor="ctr"/>
+          <a:lstStyle/>
+          <a:p>
+            <a:pPr algn="ctr"/>
+            <a:r>
+              <a:rPr lang="pt-BR" dirty="0" smtClean="0"/>
+              <a:t>Luminosidade</a:t>
+            </a:r>
+            <a:endParaRPr lang="pt-BR" dirty="0"/>
+          </a:p>
+        </p:txBody>
+      </p:sp>
+      <p:sp>
+        <p:nvSpPr>
+          <p:cNvPr id="9" name="Rounded Rectangle 8"/>
+          <p:cNvSpPr/>
+          <p:nvPr/>
+        </p:nvSpPr>
+        <p:spPr>
+          <a:xfrm>
+            <a:off x="3239410" y="3021681"/>
+            <a:ext cx="1715008" cy="472806"/>
+          </a:xfrm>
+          <a:prstGeom prst="roundRect">
+            <a:avLst/>
+          </a:prstGeom>
+        </p:spPr>
+        <p:style>
+          <a:lnRef idx="1">
+            <a:schemeClr val="accent1"/>
+          </a:lnRef>
+          <a:fillRef idx="3">
+            <a:schemeClr val="accent1"/>
+          </a:fillRef>
+          <a:effectRef idx="2">
+            <a:schemeClr val="accent1"/>
+          </a:effectRef>
+          <a:fontRef idx="minor">
+            <a:schemeClr val="lt1"/>
+          </a:fontRef>
+        </p:style>
+        <p:txBody>
+          <a:bodyPr rtlCol="0" anchor="ctr"/>
+          <a:lstStyle/>
+          <a:p>
+            <a:pPr algn="ctr"/>
+            <a:r>
+              <a:rPr lang="pt-BR" dirty="0" smtClean="0"/>
+              <a:t>Quantidade</a:t>
+            </a:r>
+            <a:endParaRPr lang="pt-BR" dirty="0"/>
+          </a:p>
+        </p:txBody>
+      </p:sp>
+      <p:sp>
+        <p:nvSpPr>
+          <p:cNvPr id="10" name="Rounded Rectangle 9"/>
+          <p:cNvSpPr/>
+          <p:nvPr/>
+        </p:nvSpPr>
+        <p:spPr>
+          <a:xfrm>
+            <a:off x="3239410" y="3606512"/>
+            <a:ext cx="1715008" cy="946745"/>
+          </a:xfrm>
+          <a:prstGeom prst="roundRect">
+            <a:avLst/>
+          </a:prstGeom>
+        </p:spPr>
+        <p:style>
+          <a:lnRef idx="1">
+            <a:schemeClr val="accent1"/>
+          </a:lnRef>
+          <a:fillRef idx="3">
+            <a:schemeClr val="accent1"/>
+          </a:fillRef>
+          <a:effectRef idx="2">
+            <a:schemeClr val="accent1"/>
+          </a:effectRef>
+          <a:fontRef idx="minor">
+            <a:schemeClr val="lt1"/>
+          </a:fontRef>
+        </p:style>
+        <p:txBody>
+          <a:bodyPr rtlCol="0" anchor="ctr"/>
+          <a:lstStyle/>
+          <a:p>
+            <a:pPr algn="ctr"/>
+            <a:r>
+              <a:rPr lang="pt-BR" dirty="0" smtClean="0"/>
+              <a:t>Frequ</a:t>
+            </a:r>
+            <a:r>
+              <a:rPr lang="pt-BR" dirty="0" smtClean="0"/>
+              <a:t>ência de entrada e saída</a:t>
+            </a:r>
+            <a:endParaRPr lang="pt-BR" dirty="0"/>
+          </a:p>
+        </p:txBody>
+      </p:sp>
+      <p:sp>
+        <p:nvSpPr>
+          <p:cNvPr id="11" name="Rounded Rectangle 10"/>
+          <p:cNvSpPr/>
+          <p:nvPr/>
+        </p:nvSpPr>
+        <p:spPr>
+          <a:xfrm>
+            <a:off x="3239410" y="5170324"/>
+            <a:ext cx="1715008" cy="472806"/>
+          </a:xfrm>
+          <a:prstGeom prst="roundRect">
+            <a:avLst/>
+          </a:prstGeom>
+        </p:spPr>
+        <p:style>
+          <a:lnRef idx="1">
+            <a:schemeClr val="accent1"/>
+          </a:lnRef>
+          <a:fillRef idx="3">
+            <a:schemeClr val="accent1"/>
+          </a:fillRef>
+          <a:effectRef idx="2">
+            <a:schemeClr val="accent1"/>
+          </a:effectRef>
+          <a:fontRef idx="minor">
+            <a:schemeClr val="lt1"/>
+          </a:fontRef>
+        </p:style>
+        <p:txBody>
+          <a:bodyPr rtlCol="0" anchor="ctr"/>
+          <a:lstStyle/>
+          <a:p>
+            <a:pPr algn="ctr"/>
+            <a:r>
+              <a:rPr lang="pt-BR" dirty="0" smtClean="0"/>
+              <a:t>Quem s</a:t>
+            </a:r>
+            <a:r>
+              <a:rPr lang="pt-BR" dirty="0" smtClean="0"/>
+              <a:t>ão?</a:t>
+            </a:r>
+            <a:endParaRPr lang="pt-BR" dirty="0"/>
+          </a:p>
+        </p:txBody>
+      </p:sp>
+      <p:sp>
+        <p:nvSpPr>
+          <p:cNvPr id="12" name="Rounded Rectangle 11"/>
+          <p:cNvSpPr/>
+          <p:nvPr/>
+        </p:nvSpPr>
+        <p:spPr>
+          <a:xfrm>
+            <a:off x="3239410" y="4604246"/>
+            <a:ext cx="1715008" cy="472806"/>
+          </a:xfrm>
+          <a:prstGeom prst="roundRect">
+            <a:avLst/>
+          </a:prstGeom>
+        </p:spPr>
+        <p:style>
+          <a:lnRef idx="1">
+            <a:schemeClr val="accent1"/>
+          </a:lnRef>
+          <a:fillRef idx="3">
+            <a:schemeClr val="accent1"/>
+          </a:fillRef>
+          <a:effectRef idx="2">
+            <a:schemeClr val="accent1"/>
+          </a:effectRef>
+          <a:fontRef idx="minor">
+            <a:schemeClr val="lt1"/>
+          </a:fontRef>
+        </p:style>
+        <p:txBody>
+          <a:bodyPr rtlCol="0" anchor="ctr"/>
+          <a:lstStyle/>
+          <a:p>
+            <a:pPr algn="ctr"/>
+            <a:r>
+              <a:rPr lang="pt-BR" dirty="0" smtClean="0"/>
+              <a:t>Onde est</a:t>
+            </a:r>
+            <a:r>
+              <a:rPr lang="pt-BR" dirty="0" smtClean="0"/>
+              <a:t>ão?</a:t>
+            </a:r>
+            <a:endParaRPr lang="pt-BR" dirty="0"/>
+          </a:p>
+        </p:txBody>
+      </p:sp>
+      <p:sp>
+        <p:nvSpPr>
+          <p:cNvPr id="13" name="Rounded Rectangle 12"/>
+          <p:cNvSpPr/>
+          <p:nvPr/>
+        </p:nvSpPr>
+        <p:spPr>
+          <a:xfrm>
+            <a:off x="3239410" y="5722392"/>
+            <a:ext cx="1715008" cy="472806"/>
+          </a:xfrm>
+          <a:prstGeom prst="roundRect">
+            <a:avLst/>
+          </a:prstGeom>
+        </p:spPr>
+        <p:style>
+          <a:lnRef idx="1">
+            <a:schemeClr val="accent1"/>
+          </a:lnRef>
+          <a:fillRef idx="3">
+            <a:schemeClr val="accent1"/>
+          </a:fillRef>
+          <a:effectRef idx="2">
+            <a:schemeClr val="accent1"/>
+          </a:effectRef>
+          <a:fontRef idx="minor">
+            <a:schemeClr val="lt1"/>
+          </a:fontRef>
+        </p:style>
+        <p:txBody>
+          <a:bodyPr rtlCol="0" anchor="ctr"/>
+          <a:lstStyle/>
+          <a:p>
+            <a:pPr algn="ctr"/>
+            <a:r>
+              <a:rPr lang="pt-BR" dirty="0" smtClean="0"/>
+              <a:t>O que est</a:t>
+            </a:r>
+            <a:r>
+              <a:rPr lang="pt-BR" dirty="0" smtClean="0"/>
+              <a:t>ão fazendo?</a:t>
+            </a:r>
+            <a:endParaRPr lang="pt-BR" dirty="0"/>
+          </a:p>
+        </p:txBody>
+      </p:sp>
+      <p:sp>
+        <p:nvSpPr>
+          <p:cNvPr id="14" name="Rounded Rectangle 13"/>
+          <p:cNvSpPr/>
+          <p:nvPr/>
+        </p:nvSpPr>
+        <p:spPr>
+          <a:xfrm>
+            <a:off x="574758" y="2548875"/>
+            <a:ext cx="1715008" cy="472806"/>
+          </a:xfrm>
+          <a:prstGeom prst="roundRect">
+            <a:avLst/>
+          </a:prstGeom>
+        </p:spPr>
+        <p:style>
+          <a:lnRef idx="1">
+            <a:schemeClr val="accent1"/>
+          </a:lnRef>
+          <a:fillRef idx="3">
+            <a:schemeClr val="accent1"/>
+          </a:fillRef>
+          <a:effectRef idx="2">
+            <a:schemeClr val="accent1"/>
+          </a:effectRef>
+          <a:fontRef idx="minor">
+            <a:schemeClr val="lt1"/>
+          </a:fontRef>
+        </p:style>
+        <p:txBody>
+          <a:bodyPr rtlCol="0" anchor="ctr"/>
+          <a:lstStyle/>
+          <a:p>
+            <a:pPr algn="ctr"/>
+            <a:r>
+              <a:rPr lang="pt-BR" dirty="0" smtClean="0"/>
+              <a:t>Umidade</a:t>
+            </a:r>
+            <a:endParaRPr lang="pt-BR" dirty="0"/>
+          </a:p>
+        </p:txBody>
+      </p:sp>
+      <p:sp>
+        <p:nvSpPr>
+          <p:cNvPr id="16" name="Rounded Rectangle 15"/>
+          <p:cNvSpPr/>
+          <p:nvPr/>
+        </p:nvSpPr>
+        <p:spPr>
+          <a:xfrm>
+            <a:off x="380838" y="4715400"/>
+            <a:ext cx="1715008" cy="472806"/>
+          </a:xfrm>
+          <a:prstGeom prst="roundRect">
+            <a:avLst/>
+          </a:prstGeom>
+        </p:spPr>
+        <p:style>
+          <a:lnRef idx="1">
+            <a:schemeClr val="accent1"/>
+          </a:lnRef>
+          <a:fillRef idx="3">
+            <a:schemeClr val="accent1"/>
+          </a:fillRef>
+          <a:effectRef idx="2">
+            <a:schemeClr val="accent1"/>
+          </a:effectRef>
+          <a:fontRef idx="minor">
+            <a:schemeClr val="lt1"/>
+          </a:fontRef>
+        </p:style>
+        <p:txBody>
+          <a:bodyPr rtlCol="0" anchor="ctr"/>
+          <a:lstStyle/>
+          <a:p>
+            <a:pPr algn="ctr"/>
+            <a:r>
+              <a:rPr lang="pt-BR" dirty="0" smtClean="0"/>
+              <a:t>Usu</a:t>
+            </a:r>
+            <a:r>
+              <a:rPr lang="pt-BR" dirty="0" smtClean="0"/>
+              <a:t>ários</a:t>
+            </a:r>
+            <a:endParaRPr lang="pt-BR" dirty="0"/>
+          </a:p>
+        </p:txBody>
+      </p:sp>
+      <p:sp>
+        <p:nvSpPr>
+          <p:cNvPr id="18" name="Right Arrow 17"/>
+          <p:cNvSpPr/>
+          <p:nvPr/>
+        </p:nvSpPr>
+        <p:spPr>
+          <a:xfrm rot="18419709">
+            <a:off x="1935703" y="3791099"/>
+            <a:ext cx="1356375" cy="275323"/>
+          </a:xfrm>
+          <a:prstGeom prst="rightArrow">
+            <a:avLst>
+              <a:gd name="adj1" fmla="val 27045"/>
+              <a:gd name="adj2" fmla="val 69491"/>
+            </a:avLst>
+          </a:prstGeom>
+        </p:spPr>
+        <p:style>
+          <a:lnRef idx="1">
+            <a:schemeClr val="accent1"/>
+          </a:lnRef>
+          <a:fillRef idx="3">
+            <a:schemeClr val="accent1"/>
+          </a:fillRef>
+          <a:effectRef idx="2">
+            <a:schemeClr val="accent1"/>
+          </a:effectRef>
+          <a:fontRef idx="minor">
+            <a:schemeClr val="lt1"/>
+          </a:fontRef>
+        </p:style>
+        <p:txBody>
+          <a:bodyPr rtlCol="0" anchor="ctr"/>
+          <a:lstStyle/>
+          <a:p>
+            <a:pPr algn="ctr"/>
+            <a:endParaRPr lang="pt-BR"/>
+          </a:p>
+        </p:txBody>
+      </p:sp>
+      <p:sp>
+        <p:nvSpPr>
+          <p:cNvPr id="19" name="Right Arrow 18"/>
+          <p:cNvSpPr/>
+          <p:nvPr/>
+        </p:nvSpPr>
+        <p:spPr>
+          <a:xfrm rot="19588835">
+            <a:off x="2286614" y="4388856"/>
+            <a:ext cx="952144" cy="275323"/>
+          </a:xfrm>
+          <a:prstGeom prst="rightArrow">
+            <a:avLst>
+              <a:gd name="adj1" fmla="val 27045"/>
+              <a:gd name="adj2" fmla="val 69491"/>
+            </a:avLst>
+          </a:prstGeom>
+        </p:spPr>
+        <p:style>
+          <a:lnRef idx="1">
+            <a:schemeClr val="accent1"/>
+          </a:lnRef>
+          <a:fillRef idx="3">
+            <a:schemeClr val="accent1"/>
+          </a:fillRef>
+          <a:effectRef idx="2">
+            <a:schemeClr val="accent1"/>
+          </a:effectRef>
+          <a:fontRef idx="minor">
+            <a:schemeClr val="lt1"/>
+          </a:fontRef>
+        </p:style>
+        <p:txBody>
+          <a:bodyPr rtlCol="0" anchor="ctr"/>
+          <a:lstStyle/>
+          <a:p>
+            <a:pPr algn="ctr"/>
+            <a:endParaRPr lang="pt-BR"/>
+          </a:p>
+        </p:txBody>
+      </p:sp>
+      <p:sp>
+        <p:nvSpPr>
+          <p:cNvPr id="20" name="Right Arrow 19"/>
+          <p:cNvSpPr/>
+          <p:nvPr/>
+        </p:nvSpPr>
+        <p:spPr>
+          <a:xfrm rot="20737042">
+            <a:off x="2477314" y="4790167"/>
+            <a:ext cx="711238" cy="275323"/>
+          </a:xfrm>
+          <a:prstGeom prst="rightArrow">
+            <a:avLst>
+              <a:gd name="adj1" fmla="val 27045"/>
+              <a:gd name="adj2" fmla="val 69491"/>
+            </a:avLst>
+          </a:prstGeom>
+        </p:spPr>
+        <p:style>
+          <a:lnRef idx="1">
+            <a:schemeClr val="accent1"/>
+          </a:lnRef>
+          <a:fillRef idx="3">
+            <a:schemeClr val="accent1"/>
+          </a:fillRef>
+          <a:effectRef idx="2">
+            <a:schemeClr val="accent1"/>
+          </a:effectRef>
+          <a:fontRef idx="minor">
+            <a:schemeClr val="lt1"/>
+          </a:fontRef>
+        </p:style>
+        <p:txBody>
+          <a:bodyPr rtlCol="0" anchor="ctr"/>
+          <a:lstStyle/>
+          <a:p>
+            <a:pPr algn="ctr"/>
+            <a:endParaRPr lang="pt-BR"/>
+          </a:p>
+        </p:txBody>
+      </p:sp>
+      <p:sp>
+        <p:nvSpPr>
+          <p:cNvPr id="21" name="Right Arrow 20"/>
+          <p:cNvSpPr/>
+          <p:nvPr/>
+        </p:nvSpPr>
+        <p:spPr>
+          <a:xfrm rot="853244">
+            <a:off x="2402223" y="5221516"/>
+            <a:ext cx="620570" cy="275323"/>
+          </a:xfrm>
+          <a:prstGeom prst="rightArrow">
+            <a:avLst>
+              <a:gd name="adj1" fmla="val 27045"/>
+              <a:gd name="adj2" fmla="val 69491"/>
+            </a:avLst>
+          </a:prstGeom>
+        </p:spPr>
+        <p:style>
+          <a:lnRef idx="1">
+            <a:schemeClr val="accent1"/>
+          </a:lnRef>
+          <a:fillRef idx="3">
+            <a:schemeClr val="accent1"/>
+          </a:fillRef>
+          <a:effectRef idx="2">
+            <a:schemeClr val="accent1"/>
+          </a:effectRef>
+          <a:fontRef idx="minor">
+            <a:schemeClr val="lt1"/>
+          </a:fontRef>
+        </p:style>
+        <p:txBody>
+          <a:bodyPr rtlCol="0" anchor="ctr"/>
+          <a:lstStyle/>
+          <a:p>
+            <a:pPr algn="ctr"/>
+            <a:endParaRPr lang="pt-BR"/>
+          </a:p>
+        </p:txBody>
+      </p:sp>
+      <p:sp>
+        <p:nvSpPr>
+          <p:cNvPr id="22" name="Right Arrow 21"/>
+          <p:cNvSpPr/>
+          <p:nvPr/>
+        </p:nvSpPr>
+        <p:spPr>
+          <a:xfrm rot="1230793">
+            <a:off x="2275060" y="5584730"/>
+            <a:ext cx="835113" cy="275323"/>
+          </a:xfrm>
+          <a:prstGeom prst="rightArrow">
+            <a:avLst>
+              <a:gd name="adj1" fmla="val 27045"/>
+              <a:gd name="adj2" fmla="val 69491"/>
+            </a:avLst>
+          </a:prstGeom>
+        </p:spPr>
+        <p:style>
+          <a:lnRef idx="1">
+            <a:schemeClr val="accent1"/>
+          </a:lnRef>
+          <a:fillRef idx="3">
+            <a:schemeClr val="accent1"/>
+          </a:fillRef>
+          <a:effectRef idx="2">
+            <a:schemeClr val="accent1"/>
+          </a:effectRef>
+          <a:fontRef idx="minor">
+            <a:schemeClr val="lt1"/>
+          </a:fontRef>
+        </p:style>
+        <p:txBody>
+          <a:bodyPr rtlCol="0" anchor="ctr"/>
+          <a:lstStyle/>
+          <a:p>
+            <a:pPr algn="ctr"/>
+            <a:endParaRPr lang="pt-BR"/>
+          </a:p>
+        </p:txBody>
+      </p:sp>
     </p:spTree>
     <p:extLst>
       <p:ext uri="{BB962C8B-B14F-4D97-AF65-F5344CB8AC3E}">
         <p14:creationId xmlns:p14="http://schemas.microsoft.com/office/powerpoint/2010/main" val="3361048007"/>
+      </p:ext>
+    </p:extLst>
+  </p:cSld>
+  <p:clrMapOvr>
+    <a:masterClrMapping/>
+  </p:clrMapOvr>
+  <p:timing>
+    <p:tnLst>
+      <p:par>
+        <p:cTn xmlns:p14="http://schemas.microsoft.com/office/powerpoint/2010/main" id="1" dur="indefinite" restart="never" nodeType="tmRoot">
+          <p:childTnLst>
+            <p:seq concurrent="1" nextAc="seek">
+              <p:cTn id="2" dur="indefinite" nodeType="mainSeq">
+                <p:childTnLst>
+                  <p:par>
+                    <p:cTn id="3" fill="hold">
+                      <p:stCondLst>
+                        <p:cond delay="indefinite"/>
+                      </p:stCondLst>
+                      <p:childTnLst>
+                        <p:par>
+                          <p:cTn id="4" fill="hold">
+                            <p:stCondLst>
+                              <p:cond delay="0"/>
+                            </p:stCondLst>
+                            <p:childTnLst>
+                              <p:par>
+                                <p:cTn id="5" presetID="10" presetClass="entr" presetSubtype="0" fill="hold" grpId="0" nodeType="clickEffect">
+                                  <p:stCondLst>
+                                    <p:cond delay="0"/>
+                                  </p:stCondLst>
+                                  <p:childTnLst>
+                                    <p:set>
+                                      <p:cBhvr>
+                                        <p:cTn id="6" dur="1" fill="hold">
+                                          <p:stCondLst>
+                                            <p:cond delay="0"/>
+                                          </p:stCondLst>
+                                        </p:cTn>
+                                        <p:tgtEl>
+                                          <p:spTgt spid="7"/>
+                                        </p:tgtEl>
+                                        <p:attrNameLst>
+                                          <p:attrName>style.visibility</p:attrName>
+                                        </p:attrNameLst>
+                                      </p:cBhvr>
+                                      <p:to>
+                                        <p:strVal val="visible"/>
+                                      </p:to>
+                                    </p:set>
+                                    <p:animEffect transition="in" filter="fade">
+                                      <p:cBhvr>
+                                        <p:cTn id="7" dur="500"/>
+                                        <p:tgtEl>
+                                          <p:spTgt spid="7"/>
+                                        </p:tgtEl>
+                                      </p:cBhvr>
+                                    </p:animEffect>
+                                  </p:childTnLst>
+                                </p:cTn>
+                              </p:par>
+                            </p:childTnLst>
+                          </p:cTn>
+                        </p:par>
+                      </p:childTnLst>
+                    </p:cTn>
+                  </p:par>
+                  <p:par>
+                    <p:cTn id="8" fill="hold">
+                      <p:stCondLst>
+                        <p:cond delay="indefinite"/>
+                      </p:stCondLst>
+                      <p:childTnLst>
+                        <p:par>
+                          <p:cTn id="9" fill="hold">
+                            <p:stCondLst>
+                              <p:cond delay="0"/>
+                            </p:stCondLst>
+                            <p:childTnLst>
+                              <p:par>
+                                <p:cTn id="10" presetID="10" presetClass="entr" presetSubtype="0" fill="hold" grpId="0" nodeType="clickEffect">
+                                  <p:stCondLst>
+                                    <p:cond delay="0"/>
+                                  </p:stCondLst>
+                                  <p:childTnLst>
+                                    <p:set>
+                                      <p:cBhvr>
+                                        <p:cTn id="11" dur="1" fill="hold">
+                                          <p:stCondLst>
+                                            <p:cond delay="0"/>
+                                          </p:stCondLst>
+                                        </p:cTn>
+                                        <p:tgtEl>
+                                          <p:spTgt spid="8"/>
+                                        </p:tgtEl>
+                                        <p:attrNameLst>
+                                          <p:attrName>style.visibility</p:attrName>
+                                        </p:attrNameLst>
+                                      </p:cBhvr>
+                                      <p:to>
+                                        <p:strVal val="visible"/>
+                                      </p:to>
+                                    </p:set>
+                                    <p:animEffect transition="in" filter="fade">
+                                      <p:cBhvr>
+                                        <p:cTn id="12" dur="500"/>
+                                        <p:tgtEl>
+                                          <p:spTgt spid="8"/>
+                                        </p:tgtEl>
+                                      </p:cBhvr>
+                                    </p:animEffect>
+                                  </p:childTnLst>
+                                </p:cTn>
+                              </p:par>
+                            </p:childTnLst>
+                          </p:cTn>
+                        </p:par>
+                      </p:childTnLst>
+                    </p:cTn>
+                  </p:par>
+                  <p:par>
+                    <p:cTn id="13" fill="hold">
+                      <p:stCondLst>
+                        <p:cond delay="indefinite"/>
+                      </p:stCondLst>
+                      <p:childTnLst>
+                        <p:par>
+                          <p:cTn id="14" fill="hold">
+                            <p:stCondLst>
+                              <p:cond delay="0"/>
+                            </p:stCondLst>
+                            <p:childTnLst>
+                              <p:par>
+                                <p:cTn id="15" presetID="10" presetClass="entr" presetSubtype="0" fill="hold" grpId="0" nodeType="clickEffect">
+                                  <p:stCondLst>
+                                    <p:cond delay="0"/>
+                                  </p:stCondLst>
+                                  <p:childTnLst>
+                                    <p:set>
+                                      <p:cBhvr>
+                                        <p:cTn id="16" dur="1" fill="hold">
+                                          <p:stCondLst>
+                                            <p:cond delay="0"/>
+                                          </p:stCondLst>
+                                        </p:cTn>
+                                        <p:tgtEl>
+                                          <p:spTgt spid="14"/>
+                                        </p:tgtEl>
+                                        <p:attrNameLst>
+                                          <p:attrName>style.visibility</p:attrName>
+                                        </p:attrNameLst>
+                                      </p:cBhvr>
+                                      <p:to>
+                                        <p:strVal val="visible"/>
+                                      </p:to>
+                                    </p:set>
+                                    <p:animEffect transition="in" filter="fade">
+                                      <p:cBhvr>
+                                        <p:cTn id="17" dur="500"/>
+                                        <p:tgtEl>
+                                          <p:spTgt spid="14"/>
+                                        </p:tgtEl>
+                                      </p:cBhvr>
+                                    </p:animEffect>
+                                  </p:childTnLst>
+                                </p:cTn>
+                              </p:par>
+                            </p:childTnLst>
+                          </p:cTn>
+                        </p:par>
+                      </p:childTnLst>
+                    </p:cTn>
+                  </p:par>
+                  <p:par>
+                    <p:cTn id="18" fill="hold">
+                      <p:stCondLst>
+                        <p:cond delay="indefinite"/>
+                      </p:stCondLst>
+                      <p:childTnLst>
+                        <p:par>
+                          <p:cTn id="19" fill="hold">
+                            <p:stCondLst>
+                              <p:cond delay="0"/>
+                            </p:stCondLst>
+                            <p:childTnLst>
+                              <p:par>
+                                <p:cTn id="20" presetID="10" presetClass="entr" presetSubtype="0" fill="hold" grpId="0" nodeType="clickEffect">
+                                  <p:stCondLst>
+                                    <p:cond delay="0"/>
+                                  </p:stCondLst>
+                                  <p:childTnLst>
+                                    <p:set>
+                                      <p:cBhvr>
+                                        <p:cTn id="21" dur="1" fill="hold">
+                                          <p:stCondLst>
+                                            <p:cond delay="0"/>
+                                          </p:stCondLst>
+                                        </p:cTn>
+                                        <p:tgtEl>
+                                          <p:spTgt spid="16"/>
+                                        </p:tgtEl>
+                                        <p:attrNameLst>
+                                          <p:attrName>style.visibility</p:attrName>
+                                        </p:attrNameLst>
+                                      </p:cBhvr>
+                                      <p:to>
+                                        <p:strVal val="visible"/>
+                                      </p:to>
+                                    </p:set>
+                                    <p:animEffect transition="in" filter="fade">
+                                      <p:cBhvr>
+                                        <p:cTn id="22" dur="500"/>
+                                        <p:tgtEl>
+                                          <p:spTgt spid="16"/>
+                                        </p:tgtEl>
+                                      </p:cBhvr>
+                                    </p:animEffect>
+                                  </p:childTnLst>
+                                </p:cTn>
+                              </p:par>
+                            </p:childTnLst>
+                          </p:cTn>
+                        </p:par>
+                      </p:childTnLst>
+                    </p:cTn>
+                  </p:par>
+                  <p:par>
+                    <p:cTn id="23" fill="hold">
+                      <p:stCondLst>
+                        <p:cond delay="indefinite"/>
+                      </p:stCondLst>
+                      <p:childTnLst>
+                        <p:par>
+                          <p:cTn id="24" fill="hold">
+                            <p:stCondLst>
+                              <p:cond delay="0"/>
+                            </p:stCondLst>
+                            <p:childTnLst>
+                              <p:par>
+                                <p:cTn id="25" presetID="10" presetClass="entr" presetSubtype="0" fill="hold" grpId="0" nodeType="clickEffect">
+                                  <p:stCondLst>
+                                    <p:cond delay="0"/>
+                                  </p:stCondLst>
+                                  <p:childTnLst>
+                                    <p:set>
+                                      <p:cBhvr>
+                                        <p:cTn id="26" dur="1" fill="hold">
+                                          <p:stCondLst>
+                                            <p:cond delay="0"/>
+                                          </p:stCondLst>
+                                        </p:cTn>
+                                        <p:tgtEl>
+                                          <p:spTgt spid="9"/>
+                                        </p:tgtEl>
+                                        <p:attrNameLst>
+                                          <p:attrName>style.visibility</p:attrName>
+                                        </p:attrNameLst>
+                                      </p:cBhvr>
+                                      <p:to>
+                                        <p:strVal val="visible"/>
+                                      </p:to>
+                                    </p:set>
+                                    <p:animEffect transition="in" filter="fade">
+                                      <p:cBhvr>
+                                        <p:cTn id="27" dur="500"/>
+                                        <p:tgtEl>
+                                          <p:spTgt spid="9"/>
+                                        </p:tgtEl>
+                                      </p:cBhvr>
+                                    </p:animEffect>
+                                  </p:childTnLst>
+                                </p:cTn>
+                              </p:par>
+                              <p:par>
+                                <p:cTn id="28" presetID="10" presetClass="entr" presetSubtype="0" fill="hold" grpId="0" nodeType="withEffect">
+                                  <p:stCondLst>
+                                    <p:cond delay="0"/>
+                                  </p:stCondLst>
+                                  <p:childTnLst>
+                                    <p:set>
+                                      <p:cBhvr>
+                                        <p:cTn id="29" dur="1" fill="hold">
+                                          <p:stCondLst>
+                                            <p:cond delay="0"/>
+                                          </p:stCondLst>
+                                        </p:cTn>
+                                        <p:tgtEl>
+                                          <p:spTgt spid="18"/>
+                                        </p:tgtEl>
+                                        <p:attrNameLst>
+                                          <p:attrName>style.visibility</p:attrName>
+                                        </p:attrNameLst>
+                                      </p:cBhvr>
+                                      <p:to>
+                                        <p:strVal val="visible"/>
+                                      </p:to>
+                                    </p:set>
+                                    <p:animEffect transition="in" filter="fade">
+                                      <p:cBhvr>
+                                        <p:cTn id="30" dur="500"/>
+                                        <p:tgtEl>
+                                          <p:spTgt spid="18"/>
+                                        </p:tgtEl>
+                                      </p:cBhvr>
+                                    </p:animEffect>
+                                  </p:childTnLst>
+                                </p:cTn>
+                              </p:par>
+                            </p:childTnLst>
+                          </p:cTn>
+                        </p:par>
+                      </p:childTnLst>
+                    </p:cTn>
+                  </p:par>
+                  <p:par>
+                    <p:cTn id="31" fill="hold">
+                      <p:stCondLst>
+                        <p:cond delay="indefinite"/>
+                      </p:stCondLst>
+                      <p:childTnLst>
+                        <p:par>
+                          <p:cTn id="32" fill="hold">
+                            <p:stCondLst>
+                              <p:cond delay="0"/>
+                            </p:stCondLst>
+                            <p:childTnLst>
+                              <p:par>
+                                <p:cTn id="33" presetID="10" presetClass="entr" presetSubtype="0" fill="hold" grpId="0" nodeType="clickEffect">
+                                  <p:stCondLst>
+                                    <p:cond delay="0"/>
+                                  </p:stCondLst>
+                                  <p:childTnLst>
+                                    <p:set>
+                                      <p:cBhvr>
+                                        <p:cTn id="34" dur="1" fill="hold">
+                                          <p:stCondLst>
+                                            <p:cond delay="0"/>
+                                          </p:stCondLst>
+                                        </p:cTn>
+                                        <p:tgtEl>
+                                          <p:spTgt spid="10"/>
+                                        </p:tgtEl>
+                                        <p:attrNameLst>
+                                          <p:attrName>style.visibility</p:attrName>
+                                        </p:attrNameLst>
+                                      </p:cBhvr>
+                                      <p:to>
+                                        <p:strVal val="visible"/>
+                                      </p:to>
+                                    </p:set>
+                                    <p:animEffect transition="in" filter="fade">
+                                      <p:cBhvr>
+                                        <p:cTn id="35" dur="500"/>
+                                        <p:tgtEl>
+                                          <p:spTgt spid="10"/>
+                                        </p:tgtEl>
+                                      </p:cBhvr>
+                                    </p:animEffect>
+                                  </p:childTnLst>
+                                </p:cTn>
+                              </p:par>
+                              <p:par>
+                                <p:cTn id="36" presetID="10" presetClass="entr" presetSubtype="0" fill="hold" grpId="0" nodeType="withEffect">
+                                  <p:stCondLst>
+                                    <p:cond delay="0"/>
+                                  </p:stCondLst>
+                                  <p:childTnLst>
+                                    <p:set>
+                                      <p:cBhvr>
+                                        <p:cTn id="37" dur="1" fill="hold">
+                                          <p:stCondLst>
+                                            <p:cond delay="0"/>
+                                          </p:stCondLst>
+                                        </p:cTn>
+                                        <p:tgtEl>
+                                          <p:spTgt spid="19"/>
+                                        </p:tgtEl>
+                                        <p:attrNameLst>
+                                          <p:attrName>style.visibility</p:attrName>
+                                        </p:attrNameLst>
+                                      </p:cBhvr>
+                                      <p:to>
+                                        <p:strVal val="visible"/>
+                                      </p:to>
+                                    </p:set>
+                                    <p:animEffect transition="in" filter="fade">
+                                      <p:cBhvr>
+                                        <p:cTn id="38" dur="500"/>
+                                        <p:tgtEl>
+                                          <p:spTgt spid="19"/>
+                                        </p:tgtEl>
+                                      </p:cBhvr>
+                                    </p:animEffect>
+                                  </p:childTnLst>
+                                </p:cTn>
+                              </p:par>
+                            </p:childTnLst>
+                          </p:cTn>
+                        </p:par>
+                      </p:childTnLst>
+                    </p:cTn>
+                  </p:par>
+                  <p:par>
+                    <p:cTn id="39" fill="hold">
+                      <p:stCondLst>
+                        <p:cond delay="indefinite"/>
+                      </p:stCondLst>
+                      <p:childTnLst>
+                        <p:par>
+                          <p:cTn id="40" fill="hold">
+                            <p:stCondLst>
+                              <p:cond delay="0"/>
+                            </p:stCondLst>
+                            <p:childTnLst>
+                              <p:par>
+                                <p:cTn id="41" presetID="10" presetClass="entr" presetSubtype="0" fill="hold" grpId="0" nodeType="clickEffect">
+                                  <p:stCondLst>
+                                    <p:cond delay="0"/>
+                                  </p:stCondLst>
+                                  <p:childTnLst>
+                                    <p:set>
+                                      <p:cBhvr>
+                                        <p:cTn id="42" dur="1" fill="hold">
+                                          <p:stCondLst>
+                                            <p:cond delay="0"/>
+                                          </p:stCondLst>
+                                        </p:cTn>
+                                        <p:tgtEl>
+                                          <p:spTgt spid="12"/>
+                                        </p:tgtEl>
+                                        <p:attrNameLst>
+                                          <p:attrName>style.visibility</p:attrName>
+                                        </p:attrNameLst>
+                                      </p:cBhvr>
+                                      <p:to>
+                                        <p:strVal val="visible"/>
+                                      </p:to>
+                                    </p:set>
+                                    <p:animEffect transition="in" filter="fade">
+                                      <p:cBhvr>
+                                        <p:cTn id="43" dur="500"/>
+                                        <p:tgtEl>
+                                          <p:spTgt spid="12"/>
+                                        </p:tgtEl>
+                                      </p:cBhvr>
+                                    </p:animEffect>
+                                  </p:childTnLst>
+                                </p:cTn>
+                              </p:par>
+                              <p:par>
+                                <p:cTn id="44" presetID="10" presetClass="entr" presetSubtype="0" fill="hold" grpId="0" nodeType="withEffect">
+                                  <p:stCondLst>
+                                    <p:cond delay="0"/>
+                                  </p:stCondLst>
+                                  <p:childTnLst>
+                                    <p:set>
+                                      <p:cBhvr>
+                                        <p:cTn id="45" dur="1" fill="hold">
+                                          <p:stCondLst>
+                                            <p:cond delay="0"/>
+                                          </p:stCondLst>
+                                        </p:cTn>
+                                        <p:tgtEl>
+                                          <p:spTgt spid="20"/>
+                                        </p:tgtEl>
+                                        <p:attrNameLst>
+                                          <p:attrName>style.visibility</p:attrName>
+                                        </p:attrNameLst>
+                                      </p:cBhvr>
+                                      <p:to>
+                                        <p:strVal val="visible"/>
+                                      </p:to>
+                                    </p:set>
+                                    <p:animEffect transition="in" filter="fade">
+                                      <p:cBhvr>
+                                        <p:cTn id="46" dur="500"/>
+                                        <p:tgtEl>
+                                          <p:spTgt spid="20"/>
+                                        </p:tgtEl>
+                                      </p:cBhvr>
+                                    </p:animEffect>
+                                  </p:childTnLst>
+                                </p:cTn>
+                              </p:par>
+                            </p:childTnLst>
+                          </p:cTn>
+                        </p:par>
+                      </p:childTnLst>
+                    </p:cTn>
+                  </p:par>
+                  <p:par>
+                    <p:cTn id="47" fill="hold">
+                      <p:stCondLst>
+                        <p:cond delay="indefinite"/>
+                      </p:stCondLst>
+                      <p:childTnLst>
+                        <p:par>
+                          <p:cTn id="48" fill="hold">
+                            <p:stCondLst>
+                              <p:cond delay="0"/>
+                            </p:stCondLst>
+                            <p:childTnLst>
+                              <p:par>
+                                <p:cTn id="49" presetID="10" presetClass="entr" presetSubtype="0" fill="hold" grpId="0" nodeType="clickEffect">
+                                  <p:stCondLst>
+                                    <p:cond delay="0"/>
+                                  </p:stCondLst>
+                                  <p:childTnLst>
+                                    <p:set>
+                                      <p:cBhvr>
+                                        <p:cTn id="50" dur="1" fill="hold">
+                                          <p:stCondLst>
+                                            <p:cond delay="0"/>
+                                          </p:stCondLst>
+                                        </p:cTn>
+                                        <p:tgtEl>
+                                          <p:spTgt spid="11"/>
+                                        </p:tgtEl>
+                                        <p:attrNameLst>
+                                          <p:attrName>style.visibility</p:attrName>
+                                        </p:attrNameLst>
+                                      </p:cBhvr>
+                                      <p:to>
+                                        <p:strVal val="visible"/>
+                                      </p:to>
+                                    </p:set>
+                                    <p:animEffect transition="in" filter="fade">
+                                      <p:cBhvr>
+                                        <p:cTn id="51" dur="500"/>
+                                        <p:tgtEl>
+                                          <p:spTgt spid="11"/>
+                                        </p:tgtEl>
+                                      </p:cBhvr>
+                                    </p:animEffect>
+                                  </p:childTnLst>
+                                </p:cTn>
+                              </p:par>
+                              <p:par>
+                                <p:cTn id="52" presetID="10" presetClass="entr" presetSubtype="0" fill="hold" grpId="0" nodeType="withEffect">
+                                  <p:stCondLst>
+                                    <p:cond delay="0"/>
+                                  </p:stCondLst>
+                                  <p:childTnLst>
+                                    <p:set>
+                                      <p:cBhvr>
+                                        <p:cTn id="53" dur="1" fill="hold">
+                                          <p:stCondLst>
+                                            <p:cond delay="0"/>
+                                          </p:stCondLst>
+                                        </p:cTn>
+                                        <p:tgtEl>
+                                          <p:spTgt spid="21"/>
+                                        </p:tgtEl>
+                                        <p:attrNameLst>
+                                          <p:attrName>style.visibility</p:attrName>
+                                        </p:attrNameLst>
+                                      </p:cBhvr>
+                                      <p:to>
+                                        <p:strVal val="visible"/>
+                                      </p:to>
+                                    </p:set>
+                                    <p:animEffect transition="in" filter="fade">
+                                      <p:cBhvr>
+                                        <p:cTn id="54" dur="500"/>
+                                        <p:tgtEl>
+                                          <p:spTgt spid="21"/>
+                                        </p:tgtEl>
+                                      </p:cBhvr>
+                                    </p:animEffect>
+                                  </p:childTnLst>
+                                </p:cTn>
+                              </p:par>
+                            </p:childTnLst>
+                          </p:cTn>
+                        </p:par>
+                      </p:childTnLst>
+                    </p:cTn>
+                  </p:par>
+                  <p:par>
+                    <p:cTn id="55" fill="hold">
+                      <p:stCondLst>
+                        <p:cond delay="indefinite"/>
+                      </p:stCondLst>
+                      <p:childTnLst>
+                        <p:par>
+                          <p:cTn id="56" fill="hold">
+                            <p:stCondLst>
+                              <p:cond delay="0"/>
+                            </p:stCondLst>
+                            <p:childTnLst>
+                              <p:par>
+                                <p:cTn id="57" presetID="10" presetClass="entr" presetSubtype="0" fill="hold" grpId="0" nodeType="clickEffect">
+                                  <p:stCondLst>
+                                    <p:cond delay="0"/>
+                                  </p:stCondLst>
+                                  <p:childTnLst>
+                                    <p:set>
+                                      <p:cBhvr>
+                                        <p:cTn id="58" dur="1" fill="hold">
+                                          <p:stCondLst>
+                                            <p:cond delay="0"/>
+                                          </p:stCondLst>
+                                        </p:cTn>
+                                        <p:tgtEl>
+                                          <p:spTgt spid="13"/>
+                                        </p:tgtEl>
+                                        <p:attrNameLst>
+                                          <p:attrName>style.visibility</p:attrName>
+                                        </p:attrNameLst>
+                                      </p:cBhvr>
+                                      <p:to>
+                                        <p:strVal val="visible"/>
+                                      </p:to>
+                                    </p:set>
+                                    <p:animEffect transition="in" filter="fade">
+                                      <p:cBhvr>
+                                        <p:cTn id="59" dur="500"/>
+                                        <p:tgtEl>
+                                          <p:spTgt spid="13"/>
+                                        </p:tgtEl>
+                                      </p:cBhvr>
+                                    </p:animEffect>
+                                  </p:childTnLst>
+                                </p:cTn>
+                              </p:par>
+                              <p:par>
+                                <p:cTn id="60" presetID="10" presetClass="entr" presetSubtype="0" fill="hold" grpId="0" nodeType="withEffect">
+                                  <p:stCondLst>
+                                    <p:cond delay="0"/>
+                                  </p:stCondLst>
+                                  <p:childTnLst>
+                                    <p:set>
+                                      <p:cBhvr>
+                                        <p:cTn id="61" dur="1" fill="hold">
+                                          <p:stCondLst>
+                                            <p:cond delay="0"/>
+                                          </p:stCondLst>
+                                        </p:cTn>
+                                        <p:tgtEl>
+                                          <p:spTgt spid="22"/>
+                                        </p:tgtEl>
+                                        <p:attrNameLst>
+                                          <p:attrName>style.visibility</p:attrName>
+                                        </p:attrNameLst>
+                                      </p:cBhvr>
+                                      <p:to>
+                                        <p:strVal val="visible"/>
+                                      </p:to>
+                                    </p:set>
+                                    <p:animEffect transition="in" filter="fade">
+                                      <p:cBhvr>
+                                        <p:cTn id="62" dur="500"/>
+                                        <p:tgtEl>
+                                          <p:spTgt spid="22"/>
+                                        </p:tgtEl>
+                                      </p:cBhvr>
+                                    </p:animEffect>
+                                  </p:childTnLst>
+                                </p:cTn>
+                              </p:par>
+                            </p:childTnLst>
+                          </p:cTn>
+                        </p:par>
+                      </p:childTnLst>
+                    </p:cTn>
+                  </p:par>
+                  <p:par>
+                    <p:cTn id="63" fill="hold">
+                      <p:stCondLst>
+                        <p:cond delay="indefinite"/>
+                      </p:stCondLst>
+                      <p:childTnLst>
+                        <p:par>
+                          <p:cTn id="64" fill="hold">
+                            <p:stCondLst>
+                              <p:cond delay="0"/>
+                            </p:stCondLst>
+                            <p:childTnLst>
+                              <p:par>
+                                <p:cTn id="65" presetID="1" presetClass="emph" presetSubtype="2" fill="hold" nodeType="clickEffect">
+                                  <p:stCondLst>
+                                    <p:cond delay="0"/>
+                                  </p:stCondLst>
+                                  <p:childTnLst>
+                                    <p:animClr clrSpc="rgb" dir="cw">
+                                      <p:cBhvr>
+                                        <p:cTn id="66" dur="2000" fill="hold"/>
+                                        <p:tgtEl>
+                                          <p:spTgt spid="11"/>
+                                        </p:tgtEl>
+                                        <p:attrNameLst>
+                                          <p:attrName>fillcolor</p:attrName>
+                                        </p:attrNameLst>
+                                      </p:cBhvr>
+                                      <p:to>
+                                        <a:schemeClr val="accent2"/>
+                                      </p:to>
+                                    </p:animClr>
+                                    <p:set>
+                                      <p:cBhvr>
+                                        <p:cTn id="67" dur="2000" fill="hold"/>
+                                        <p:tgtEl>
+                                          <p:spTgt spid="11"/>
+                                        </p:tgtEl>
+                                        <p:attrNameLst>
+                                          <p:attrName>fill.type</p:attrName>
+                                        </p:attrNameLst>
+                                      </p:cBhvr>
+                                      <p:to>
+                                        <p:strVal val="solid"/>
+                                      </p:to>
+                                    </p:set>
+                                    <p:set>
+                                      <p:cBhvr>
+                                        <p:cTn id="68" dur="2000" fill="hold"/>
+                                        <p:tgtEl>
+                                          <p:spTgt spid="11"/>
+                                        </p:tgtEl>
+                                        <p:attrNameLst>
+                                          <p:attrName>fill.on</p:attrName>
+                                        </p:attrNameLst>
+                                      </p:cBhvr>
+                                      <p:to>
+                                        <p:strVal val="true"/>
+                                      </p:to>
+                                    </p:set>
+                                  </p:childTnLst>
+                                </p:cTn>
+                              </p:par>
+                              <p:par>
+                                <p:cTn id="69" presetID="1" presetClass="emph" presetSubtype="2" fill="hold" nodeType="withEffect">
+                                  <p:stCondLst>
+                                    <p:cond delay="0"/>
+                                  </p:stCondLst>
+                                  <p:childTnLst>
+                                    <p:animClr clrSpc="rgb" dir="cw">
+                                      <p:cBhvr>
+                                        <p:cTn id="70" dur="2000" fill="hold"/>
+                                        <p:tgtEl>
+                                          <p:spTgt spid="12"/>
+                                        </p:tgtEl>
+                                        <p:attrNameLst>
+                                          <p:attrName>fillcolor</p:attrName>
+                                        </p:attrNameLst>
+                                      </p:cBhvr>
+                                      <p:to>
+                                        <a:schemeClr val="accent2"/>
+                                      </p:to>
+                                    </p:animClr>
+                                    <p:set>
+                                      <p:cBhvr>
+                                        <p:cTn id="71" dur="2000" fill="hold"/>
+                                        <p:tgtEl>
+                                          <p:spTgt spid="12"/>
+                                        </p:tgtEl>
+                                        <p:attrNameLst>
+                                          <p:attrName>fill.type</p:attrName>
+                                        </p:attrNameLst>
+                                      </p:cBhvr>
+                                      <p:to>
+                                        <p:strVal val="solid"/>
+                                      </p:to>
+                                    </p:set>
+                                    <p:set>
+                                      <p:cBhvr>
+                                        <p:cTn id="72" dur="2000" fill="hold"/>
+                                        <p:tgtEl>
+                                          <p:spTgt spid="12"/>
+                                        </p:tgtEl>
+                                        <p:attrNameLst>
+                                          <p:attrName>fill.on</p:attrName>
+                                        </p:attrNameLst>
+                                      </p:cBhvr>
+                                      <p:to>
+                                        <p:strVal val="true"/>
+                                      </p:to>
+                                    </p:set>
+                                  </p:childTnLst>
+                                </p:cTn>
+                              </p:par>
+                            </p:childTnLst>
+                          </p:cTn>
+                        </p:par>
+                      </p:childTnLst>
+                    </p:cTn>
+                  </p:par>
+                </p:childTnLst>
+              </p:cTn>
+              <p:prevCondLst>
+                <p:cond evt="onPrev" delay="0">
+                  <p:tgtEl>
+                    <p:sldTgt/>
+                  </p:tgtEl>
+                </p:cond>
+              </p:prevCondLst>
+              <p:nextCondLst>
+                <p:cond evt="onNext" delay="0">
+                  <p:tgtEl>
+                    <p:sldTgt/>
+                  </p:tgtEl>
+                </p:cond>
+              </p:nextCondLst>
+            </p:seq>
+          </p:childTnLst>
+        </p:cTn>
+      </p:par>
+    </p:tnLst>
+    <p:bldLst>
+      <p:bldP spid="7" grpId="0" animBg="1"/>
+      <p:bldP spid="8" grpId="0" animBg="1"/>
+      <p:bldP spid="9" grpId="0" animBg="1"/>
+      <p:bldP spid="10" grpId="0" animBg="1"/>
+      <p:bldP spid="11" grpId="0" animBg="1"/>
+      <p:bldP spid="12" grpId="0" animBg="1"/>
+      <p:bldP spid="13" grpId="0" animBg="1"/>
+      <p:bldP spid="14" grpId="0" animBg="1"/>
+      <p:bldP spid="16" grpId="0" animBg="1"/>
+      <p:bldP spid="18" grpId="0" animBg="1"/>
+      <p:bldP spid="19" grpId="0" animBg="1"/>
+      <p:bldP spid="20" grpId="0" animBg="1"/>
+      <p:bldP spid="21" grpId="0" animBg="1"/>
+      <p:bldP spid="22" grpId="0" animBg="1"/>
+    </p:bldLst>
+  </p:timing>
+</p:sld>
+</file>
+
+<file path=ppt/slides/slide7.xml><?xml version="1.0" encoding="utf-8"?>
+<p:sld xmlns:a="http://schemas.openxmlformats.org/drawingml/2006/main" xmlns:r="http://schemas.openxmlformats.org/officeDocument/2006/relationships" xmlns:p="http://schemas.openxmlformats.org/presentationml/2006/main">
+  <p:cSld>
+    <p:spTree>
+      <p:nvGrpSpPr>
+        <p:cNvPr id="1" name=""/>
+        <p:cNvGrpSpPr/>
+        <p:nvPr/>
+      </p:nvGrpSpPr>
+      <p:grpSpPr>
+        <a:xfrm>
+          <a:off x="0" y="0"/>
+          <a:ext cx="0" cy="0"/>
+          <a:chOff x="0" y="0"/>
+          <a:chExt cx="0" cy="0"/>
+        </a:xfrm>
+      </p:grpSpPr>
+      <p:pic>
+        <p:nvPicPr>
+          <p:cNvPr id="4" name="Picture 2" descr="3D Character and Blank Board by catheryn.carcamo."/>
+          <p:cNvPicPr>
+            <a:picLocks noGrp="1" noChangeAspect="1" noChangeArrowheads="1"/>
+          </p:cNvPicPr>
+          <p:nvPr>
+            <p:ph idx="1"/>
+          </p:nvPr>
+        </p:nvPicPr>
+        <p:blipFill>
+          <a:blip r:embed="rId2">
+            <a:extLst>
+              <a:ext uri="{28A0092B-C50C-407E-A947-70E740481C1C}">
+                <a14:useLocalDpi xmlns:a14="http://schemas.microsoft.com/office/drawing/2010/main" val="0"/>
+              </a:ext>
+            </a:extLst>
+          </a:blip>
+          <a:srcRect l="-43786" r="-43786"/>
+          <a:stretch>
+            <a:fillRect/>
+          </a:stretch>
+        </p:blipFill>
+        <p:spPr bwMode="auto">
+          <a:xfrm>
+            <a:off x="457200" y="723900"/>
+            <a:ext cx="8229600" cy="5849938"/>
+          </a:xfrm>
+          <a:prstGeom prst="rect">
+            <a:avLst/>
+          </a:prstGeom>
+          <a:noFill/>
+          <a:ln>
+            <a:noFill/>
+          </a:ln>
+          <a:extLst>
+            <a:ext uri="{909E8E84-426E-40dd-AFC4-6F175D3DCCD1}">
+              <a14:hiddenFill xmlns:a14="http://schemas.microsoft.com/office/drawing/2010/main">
+                <a:solidFill>
+                  <a:srgbClr val="FFFFFF"/>
+                </a:solidFill>
+              </a14:hiddenFill>
+            </a:ext>
+            <a:ext uri="{91240B29-F687-4f45-9708-019B960494DF}">
+              <a14:hiddenLine xmlns:a14="http://schemas.microsoft.com/office/drawing/2010/main" w="9525">
+                <a:solidFill>
+                  <a:srgbClr val="000000"/>
+                </a:solidFill>
+                <a:miter lim="800000"/>
+                <a:headEnd/>
+                <a:tailEnd/>
+              </a14:hiddenLine>
+            </a:ext>
+          </a:extLst>
+        </p:spPr>
+      </p:pic>
+      <p:sp>
+        <p:nvSpPr>
+          <p:cNvPr id="8" name="Rectangle 7"/>
+          <p:cNvSpPr/>
+          <p:nvPr/>
+        </p:nvSpPr>
+        <p:spPr>
+          <a:xfrm rot="20572439">
+            <a:off x="3439875" y="2830858"/>
+            <a:ext cx="2299478" cy="954107"/>
+          </a:xfrm>
+          <a:prstGeom prst="rect">
+            <a:avLst/>
+          </a:prstGeom>
+        </p:spPr>
+        <p:txBody>
+          <a:bodyPr wrap="none">
+            <a:spAutoFit/>
+          </a:bodyPr>
+          <a:lstStyle/>
+          <a:p>
+            <a:pPr algn="ctr"/>
+            <a:r>
+              <a:rPr lang="pt-BR" sz="2800" b="1" dirty="0" smtClean="0">
+                <a:ln w="12700">
+                  <a:solidFill>
+                    <a:schemeClr val="tx2">
+                      <a:satMod val="155000"/>
+                    </a:schemeClr>
+                  </a:solidFill>
+                  <a:prstDash val="solid"/>
+                </a:ln>
+                <a:solidFill>
+                  <a:schemeClr val="bg2">
+                    <a:tint val="85000"/>
+                    <a:satMod val="155000"/>
+                  </a:schemeClr>
+                </a:solidFill>
+                <a:effectLst>
+                  <a:outerShdw blurRad="41275" dist="20320" dir="1800000" algn="tl" rotWithShape="0">
+                    <a:srgbClr val="000000">
+                      <a:alpha val="40000"/>
+                    </a:srgbClr>
+                  </a:outerShdw>
+                </a:effectLst>
+              </a:rPr>
+              <a:t>Objetivo do</a:t>
+            </a:r>
+          </a:p>
+          <a:p>
+            <a:pPr algn="ctr"/>
+            <a:r>
+              <a:rPr lang="pt-BR" sz="2800" b="1" dirty="0" smtClean="0">
+                <a:ln w="12700">
+                  <a:solidFill>
+                    <a:schemeClr val="tx2">
+                      <a:satMod val="155000"/>
+                    </a:schemeClr>
+                  </a:solidFill>
+                  <a:prstDash val="solid"/>
+                </a:ln>
+                <a:solidFill>
+                  <a:schemeClr val="bg2">
+                    <a:tint val="85000"/>
+                    <a:satMod val="155000"/>
+                  </a:schemeClr>
+                </a:solidFill>
+                <a:effectLst>
+                  <a:outerShdw blurRad="41275" dist="20320" dir="1800000" algn="tl" rotWithShape="0">
+                    <a:srgbClr val="000000">
+                      <a:alpha val="40000"/>
+                    </a:srgbClr>
+                  </a:outerShdw>
+                </a:effectLst>
+              </a:rPr>
+              <a:t>Trabalho</a:t>
+            </a:r>
+            <a:endParaRPr lang="en-US" sz="2800" dirty="0"/>
+          </a:p>
+        </p:txBody>
+      </p:sp>
+    </p:spTree>
+    <p:extLst>
+      <p:ext uri="{BB962C8B-B14F-4D97-AF65-F5344CB8AC3E}">
+        <p14:creationId xmlns:p14="http://schemas.microsoft.com/office/powerpoint/2010/main" val="2063289431"/>
+      </p:ext>
+    </p:extLst>
+  </p:cSld>
+  <p:clrMapOvr>
+    <a:masterClrMapping/>
+  </p:clrMapOvr>
+  <p:timing>
+    <p:tnLst>
+      <p:par>
+        <p:cTn xmlns:p14="http://schemas.microsoft.com/office/powerpoint/2010/main" id="1" dur="indefinite" restart="never" nodeType="tmRoot"/>
+      </p:par>
+    </p:tnLst>
+  </p:timing>
+</p:sld>
+</file>
+
+<file path=ppt/slides/slide8.xml><?xml version="1.0" encoding="utf-8"?>
+<p:sld xmlns:a="http://schemas.openxmlformats.org/drawingml/2006/main" xmlns:r="http://schemas.openxmlformats.org/officeDocument/2006/relationships" xmlns:p="http://schemas.openxmlformats.org/presentationml/2006/main">
+  <p:cSld>
+    <p:spTree>
+      <p:nvGrpSpPr>
+        <p:cNvPr id="1" name=""/>
+        <p:cNvGrpSpPr/>
+        <p:nvPr/>
+      </p:nvGrpSpPr>
+      <p:grpSpPr>
+        <a:xfrm>
+          <a:off x="0" y="0"/>
+          <a:ext cx="0" cy="0"/>
+          <a:chOff x="0" y="0"/>
+          <a:chExt cx="0" cy="0"/>
+        </a:xfrm>
+      </p:grpSpPr>
+      <p:sp>
+        <p:nvSpPr>
+          <p:cNvPr id="4" name="Rounded Rectangle 3"/>
+          <p:cNvSpPr/>
+          <p:nvPr/>
+        </p:nvSpPr>
+        <p:spPr>
+          <a:xfrm>
+            <a:off x="6702432" y="1511120"/>
+            <a:ext cx="1984368" cy="1253931"/>
+          </a:xfrm>
+          <a:prstGeom prst="roundRect">
+            <a:avLst/>
+          </a:prstGeom>
+          <a:solidFill>
+            <a:srgbClr val="FFFFFF"/>
+          </a:solidFill>
+        </p:spPr>
+        <p:style>
+          <a:lnRef idx="1">
+            <a:schemeClr val="accent6"/>
+          </a:lnRef>
+          <a:fillRef idx="3">
+            <a:schemeClr val="accent6"/>
+          </a:fillRef>
+          <a:effectRef idx="2">
+            <a:schemeClr val="accent6"/>
+          </a:effectRef>
+          <a:fontRef idx="minor">
+            <a:schemeClr val="lt1"/>
+          </a:fontRef>
+        </p:style>
+        <p:txBody>
+          <a:bodyPr rtlCol="0" anchor="t"/>
+          <a:lstStyle/>
+          <a:p>
+            <a:pPr algn="ctr"/>
+            <a:r>
+              <a:rPr lang="pt-BR" dirty="0" smtClean="0">
+                <a:solidFill>
+                  <a:schemeClr val="tx1"/>
+                </a:solidFill>
+              </a:rPr>
+              <a:t>Middleware </a:t>
+            </a:r>
+            <a:endParaRPr lang="pt-BR" dirty="0">
+              <a:solidFill>
+                <a:schemeClr val="tx1"/>
+              </a:solidFill>
+            </a:endParaRPr>
+          </a:p>
+          <a:p>
+            <a:pPr algn="ctr"/>
+            <a:endParaRPr lang="pt-BR" dirty="0">
+              <a:solidFill>
+                <a:schemeClr val="tx1"/>
+              </a:solidFill>
+            </a:endParaRPr>
+          </a:p>
+        </p:txBody>
+      </p:sp>
+      <p:sp>
+        <p:nvSpPr>
+          <p:cNvPr id="8" name="Trapezóide 23"/>
+          <p:cNvSpPr/>
+          <p:nvPr/>
+        </p:nvSpPr>
+        <p:spPr>
+          <a:xfrm rot="3758356">
+            <a:off x="5770552" y="1737856"/>
+            <a:ext cx="901298" cy="2232135"/>
+          </a:xfrm>
+          <a:prstGeom prst="trapezoid">
+            <a:avLst>
+              <a:gd name="adj" fmla="val 50000"/>
+            </a:avLst>
+          </a:prstGeom>
+          <a:solidFill>
+            <a:schemeClr val="accent1">
+              <a:alpha val="73000"/>
+            </a:schemeClr>
+          </a:solidFill>
+        </p:spPr>
+        <p:style>
+          <a:lnRef idx="2">
+            <a:schemeClr val="accent1">
+              <a:shade val="50000"/>
+            </a:schemeClr>
+          </a:lnRef>
+          <a:fillRef idx="1">
+            <a:schemeClr val="accent1"/>
+          </a:fillRef>
+          <a:effectRef idx="0">
+            <a:schemeClr val="accent1"/>
+          </a:effectRef>
+          <a:fontRef idx="minor">
+            <a:schemeClr val="lt1"/>
+          </a:fontRef>
+        </p:style>
+        <p:txBody>
+          <a:bodyPr anchor="ctr"/>
+          <a:lstStyle/>
+          <a:p>
+            <a:pPr algn="ctr"/>
+            <a:endParaRPr lang="pt-BR">
+              <a:solidFill>
+                <a:srgbClr val="FFFFFF"/>
+              </a:solidFill>
+              <a:latin typeface="Georgia" charset="0"/>
+              <a:ea typeface="ＭＳ Ｐゴシック" charset="0"/>
+              <a:cs typeface="ＭＳ Ｐゴシック" charset="0"/>
+            </a:endParaRPr>
+          </a:p>
+        </p:txBody>
+      </p:sp>
+      <p:sp>
+        <p:nvSpPr>
+          <p:cNvPr id="3" name="Content Placeholder 2"/>
+          <p:cNvSpPr>
+            <a:spLocks noGrp="1"/>
+          </p:cNvSpPr>
+          <p:nvPr>
+            <p:ph idx="1"/>
+          </p:nvPr>
+        </p:nvSpPr>
+        <p:spPr>
+          <a:xfrm>
+            <a:off x="457200" y="862175"/>
+            <a:ext cx="4836146" cy="760197"/>
+          </a:xfrm>
+        </p:spPr>
+        <p:txBody>
+          <a:bodyPr/>
+          <a:lstStyle/>
+          <a:p>
+            <a:r>
+              <a:rPr lang="en-US" dirty="0" err="1" smtClean="0"/>
+              <a:t>Objetivo</a:t>
+            </a:r>
+            <a:r>
+              <a:rPr lang="en-US" dirty="0" smtClean="0"/>
+              <a:t> do </a:t>
+            </a:r>
+            <a:r>
+              <a:rPr lang="en-US" dirty="0" err="1" smtClean="0"/>
+              <a:t>Trabalho</a:t>
+            </a:r>
+            <a:endParaRPr lang="en-US" dirty="0"/>
+          </a:p>
+        </p:txBody>
+      </p:sp>
+      <p:sp>
+        <p:nvSpPr>
+          <p:cNvPr id="5" name="Rounded Rectangle 4"/>
+          <p:cNvSpPr/>
+          <p:nvPr/>
+        </p:nvSpPr>
+        <p:spPr>
+          <a:xfrm>
+            <a:off x="3235335" y="2966623"/>
+            <a:ext cx="2215606" cy="862176"/>
+          </a:xfrm>
+          <a:prstGeom prst="roundRect">
+            <a:avLst/>
+          </a:prstGeom>
+          <a:solidFill>
+            <a:schemeClr val="bg1"/>
+          </a:solidFill>
+        </p:spPr>
+        <p:style>
+          <a:lnRef idx="1">
+            <a:schemeClr val="accent2"/>
+          </a:lnRef>
+          <a:fillRef idx="3">
+            <a:schemeClr val="accent2"/>
+          </a:fillRef>
+          <a:effectRef idx="2">
+            <a:schemeClr val="accent2"/>
+          </a:effectRef>
+          <a:fontRef idx="minor">
+            <a:schemeClr val="lt1"/>
+          </a:fontRef>
+        </p:style>
+        <p:txBody>
+          <a:bodyPr rtlCol="0" anchor="ctr"/>
+          <a:lstStyle/>
+          <a:p>
+            <a:pPr algn="ctr"/>
+            <a:r>
+              <a:rPr lang="pt-BR" dirty="0" smtClean="0">
+                <a:solidFill>
+                  <a:schemeClr val="tx1"/>
+                </a:solidFill>
+              </a:rPr>
+              <a:t>Sistema </a:t>
+            </a:r>
+            <a:r>
+              <a:rPr lang="pt-BR" b="1" dirty="0" smtClean="0">
+                <a:solidFill>
+                  <a:srgbClr val="000000"/>
+                </a:solidFill>
+              </a:rPr>
+              <a:t>TRUE</a:t>
+            </a:r>
+            <a:endParaRPr lang="pt-BR" b="1" dirty="0">
+              <a:solidFill>
+                <a:srgbClr val="000000"/>
+              </a:solidFill>
+            </a:endParaRPr>
+          </a:p>
+        </p:txBody>
+      </p:sp>
+      <p:pic>
+        <p:nvPicPr>
+          <p:cNvPr id="7" name="Picture 2" descr="I:\Nova pasta\Sem-Título-1.gif"/>
+          <p:cNvPicPr>
+            <a:picLocks noChangeAspect="1" noChangeArrowheads="1"/>
+          </p:cNvPicPr>
+          <p:nvPr/>
+        </p:nvPicPr>
+        <p:blipFill>
+          <a:blip r:embed="rId2" cstate="print"/>
+          <a:stretch>
+            <a:fillRect/>
+          </a:stretch>
+        </p:blipFill>
+        <p:spPr bwMode="auto">
+          <a:xfrm>
+            <a:off x="7330250" y="1995284"/>
+            <a:ext cx="855431" cy="769767"/>
+          </a:xfrm>
+          <a:prstGeom prst="rect">
+            <a:avLst/>
+          </a:prstGeom>
+          <a:noFill/>
+        </p:spPr>
+      </p:pic>
+      <p:sp>
+        <p:nvSpPr>
+          <p:cNvPr id="9" name="Rectangle 8"/>
+          <p:cNvSpPr/>
+          <p:nvPr/>
+        </p:nvSpPr>
+        <p:spPr>
+          <a:xfrm>
+            <a:off x="3235335" y="4029504"/>
+            <a:ext cx="2215606" cy="830997"/>
+          </a:xfrm>
+          <a:prstGeom prst="rect">
+            <a:avLst/>
+          </a:prstGeom>
+        </p:spPr>
+        <p:txBody>
+          <a:bodyPr wrap="square">
+            <a:spAutoFit/>
+          </a:bodyPr>
+          <a:lstStyle/>
+          <a:p>
+            <a:pPr algn="ctr"/>
+            <a:r>
+              <a:rPr lang="en-GB" sz="1600" dirty="0" smtClean="0">
+                <a:solidFill>
+                  <a:srgbClr val="000000"/>
+                </a:solidFill>
+              </a:rPr>
+              <a:t>Tracking and Recognizing Users in the Environment</a:t>
+            </a:r>
+            <a:endParaRPr lang="en-GB" sz="1600" dirty="0">
+              <a:solidFill>
+                <a:srgbClr val="000000"/>
+              </a:solidFill>
+            </a:endParaRPr>
+          </a:p>
+        </p:txBody>
+      </p:sp>
+      <p:pic>
+        <p:nvPicPr>
+          <p:cNvPr id="10" name="Picture 9"/>
+          <p:cNvPicPr>
+            <a:picLocks noChangeAspect="1"/>
+          </p:cNvPicPr>
+          <p:nvPr/>
+        </p:nvPicPr>
+        <p:blipFill>
+          <a:blip r:embed="rId3"/>
+          <a:stretch>
+            <a:fillRect/>
+          </a:stretch>
+        </p:blipFill>
+        <p:spPr>
+          <a:xfrm>
+            <a:off x="78243" y="2966623"/>
+            <a:ext cx="1892826" cy="1143318"/>
+          </a:xfrm>
+          <a:prstGeom prst="rect">
+            <a:avLst/>
+          </a:prstGeom>
+        </p:spPr>
+      </p:pic>
+      <p:sp>
+        <p:nvSpPr>
+          <p:cNvPr id="11" name="Striped Right Arrow 10"/>
+          <p:cNvSpPr/>
+          <p:nvPr/>
+        </p:nvSpPr>
+        <p:spPr>
+          <a:xfrm>
+            <a:off x="2122900" y="3216932"/>
+            <a:ext cx="978408" cy="484632"/>
+          </a:xfrm>
+          <a:prstGeom prst="stripedRightArrow">
+            <a:avLst/>
+          </a:prstGeom>
+        </p:spPr>
+        <p:style>
+          <a:lnRef idx="1">
+            <a:schemeClr val="accent1"/>
+          </a:lnRef>
+          <a:fillRef idx="3">
+            <a:schemeClr val="accent1"/>
+          </a:fillRef>
+          <a:effectRef idx="2">
+            <a:schemeClr val="accent1"/>
+          </a:effectRef>
+          <a:fontRef idx="minor">
+            <a:schemeClr val="lt1"/>
+          </a:fontRef>
+        </p:style>
+        <p:txBody>
+          <a:bodyPr rtlCol="0" anchor="ctr"/>
+          <a:lstStyle/>
+          <a:p>
+            <a:pPr algn="ctr"/>
+            <a:endParaRPr lang="pt-BR"/>
+          </a:p>
+        </p:txBody>
+      </p:sp>
+      <p:sp>
+        <p:nvSpPr>
+          <p:cNvPr id="12" name="TextBox 11"/>
+          <p:cNvSpPr txBox="1"/>
+          <p:nvPr/>
+        </p:nvSpPr>
+        <p:spPr>
+          <a:xfrm>
+            <a:off x="630381" y="3844838"/>
+            <a:ext cx="845041" cy="369332"/>
+          </a:xfrm>
+          <a:prstGeom prst="rect">
+            <a:avLst/>
+          </a:prstGeom>
+          <a:noFill/>
+        </p:spPr>
+        <p:txBody>
+          <a:bodyPr wrap="none" rtlCol="0">
+            <a:spAutoFit/>
+          </a:bodyPr>
+          <a:lstStyle/>
+          <a:p>
+            <a:r>
+              <a:rPr lang="pt-BR" dirty="0" err="1" smtClean="0"/>
+              <a:t>Kinect</a:t>
+            </a:r>
+            <a:endParaRPr lang="pt-BR" dirty="0"/>
+          </a:p>
+        </p:txBody>
+      </p:sp>
+    </p:spTree>
+    <p:extLst>
+      <p:ext uri="{BB962C8B-B14F-4D97-AF65-F5344CB8AC3E}">
+        <p14:creationId xmlns:p14="http://schemas.microsoft.com/office/powerpoint/2010/main" val="1282964439"/>
+      </p:ext>
+    </p:extLst>
+  </p:cSld>
+  <p:clrMapOvr>
+    <a:masterClrMapping/>
+  </p:clrMapOvr>
+  <p:timing>
+    <p:tnLst>
+      <p:par>
+        <p:cTn xmlns:p14="http://schemas.microsoft.com/office/powerpoint/2010/main" id="1" dur="indefinite" restart="never" nodeType="tmRoot">
+          <p:childTnLst>
+            <p:seq concurrent="1" nextAc="seek">
+              <p:cTn id="2" dur="indefinite" nodeType="mainSeq">
+                <p:childTnLst>
+                  <p:par>
+                    <p:cTn id="3" fill="hold">
+                      <p:stCondLst>
+                        <p:cond delay="indefinite"/>
+                      </p:stCondLst>
+                      <p:childTnLst>
+                        <p:par>
+                          <p:cTn id="4" fill="hold">
+                            <p:stCondLst>
+                              <p:cond delay="0"/>
+                            </p:stCondLst>
+                            <p:childTnLst>
+                              <p:par>
+                                <p:cTn id="5" presetID="10" presetClass="entr" presetSubtype="0" fill="hold" grpId="0" nodeType="clickEffect">
+                                  <p:stCondLst>
+                                    <p:cond delay="0"/>
+                                  </p:stCondLst>
+                                  <p:childTnLst>
+                                    <p:set>
+                                      <p:cBhvr>
+                                        <p:cTn id="6" dur="1" fill="hold">
+                                          <p:stCondLst>
+                                            <p:cond delay="0"/>
+                                          </p:stCondLst>
+                                        </p:cTn>
+                                        <p:tgtEl>
+                                          <p:spTgt spid="4"/>
+                                        </p:tgtEl>
+                                        <p:attrNameLst>
+                                          <p:attrName>style.visibility</p:attrName>
+                                        </p:attrNameLst>
+                                      </p:cBhvr>
+                                      <p:to>
+                                        <p:strVal val="visible"/>
+                                      </p:to>
+                                    </p:set>
+                                    <p:animEffect transition="in" filter="fade">
+                                      <p:cBhvr>
+                                        <p:cTn id="7" dur="500"/>
+                                        <p:tgtEl>
+                                          <p:spTgt spid="4"/>
+                                        </p:tgtEl>
+                                      </p:cBhvr>
+                                    </p:animEffect>
+                                  </p:childTnLst>
+                                </p:cTn>
+                              </p:par>
+                              <p:par>
+                                <p:cTn id="8" presetID="10" presetClass="entr" presetSubtype="0" fill="hold" nodeType="withEffect">
+                                  <p:stCondLst>
+                                    <p:cond delay="0"/>
+                                  </p:stCondLst>
+                                  <p:childTnLst>
+                                    <p:set>
+                                      <p:cBhvr>
+                                        <p:cTn id="9" dur="1" fill="hold">
+                                          <p:stCondLst>
+                                            <p:cond delay="0"/>
+                                          </p:stCondLst>
+                                        </p:cTn>
+                                        <p:tgtEl>
+                                          <p:spTgt spid="7"/>
+                                        </p:tgtEl>
+                                        <p:attrNameLst>
+                                          <p:attrName>style.visibility</p:attrName>
+                                        </p:attrNameLst>
+                                      </p:cBhvr>
+                                      <p:to>
+                                        <p:strVal val="visible"/>
+                                      </p:to>
+                                    </p:set>
+                                    <p:animEffect transition="in" filter="fade">
+                                      <p:cBhvr>
+                                        <p:cTn id="10" dur="500"/>
+                                        <p:tgtEl>
+                                          <p:spTgt spid="7"/>
+                                        </p:tgtEl>
+                                      </p:cBhvr>
+                                    </p:animEffect>
+                                  </p:childTnLst>
+                                </p:cTn>
+                              </p:par>
+                              <p:par>
+                                <p:cTn id="11" presetID="10" presetClass="entr" presetSubtype="0" fill="hold" grpId="0" nodeType="withEffect">
+                                  <p:stCondLst>
+                                    <p:cond delay="0"/>
+                                  </p:stCondLst>
+                                  <p:childTnLst>
+                                    <p:set>
+                                      <p:cBhvr>
+                                        <p:cTn id="12" dur="1" fill="hold">
+                                          <p:stCondLst>
+                                            <p:cond delay="0"/>
+                                          </p:stCondLst>
+                                        </p:cTn>
+                                        <p:tgtEl>
+                                          <p:spTgt spid="8"/>
+                                        </p:tgtEl>
+                                        <p:attrNameLst>
+                                          <p:attrName>style.visibility</p:attrName>
+                                        </p:attrNameLst>
+                                      </p:cBhvr>
+                                      <p:to>
+                                        <p:strVal val="visible"/>
+                                      </p:to>
+                                    </p:set>
+                                    <p:animEffect transition="in" filter="fade">
+                                      <p:cBhvr>
+                                        <p:cTn id="13" dur="500"/>
+                                        <p:tgtEl>
+                                          <p:spTgt spid="8"/>
+                                        </p:tgtEl>
+                                      </p:cBhvr>
+                                    </p:animEffect>
+                                  </p:childTnLst>
+                                </p:cTn>
+                              </p:par>
+                            </p:childTnLst>
+                          </p:cTn>
+                        </p:par>
+                      </p:childTnLst>
+                    </p:cTn>
+                  </p:par>
+                </p:childTnLst>
+              </p:cTn>
+              <p:prevCondLst>
+                <p:cond evt="onPrev" delay="0">
+                  <p:tgtEl>
+                    <p:sldTgt/>
+                  </p:tgtEl>
+                </p:cond>
+              </p:prevCondLst>
+              <p:nextCondLst>
+                <p:cond evt="onNext" delay="0">
+                  <p:tgtEl>
+                    <p:sldTgt/>
+                  </p:tgtEl>
+                </p:cond>
+              </p:nextCondLst>
+            </p:seq>
+          </p:childTnLst>
+        </p:cTn>
+      </p:par>
+    </p:tnLst>
+    <p:bldLst>
+      <p:bldP spid="4" grpId="0" animBg="1"/>
+      <p:bldP spid="8" grpId="0" animBg="1"/>
+    </p:bldLst>
+  </p:timing>
+</p:sld>
+</file>
+
+<file path=ppt/slides/slide9.xml><?xml version="1.0" encoding="utf-8"?>
+<p:sld xmlns:a="http://schemas.openxmlformats.org/drawingml/2006/main" xmlns:r="http://schemas.openxmlformats.org/officeDocument/2006/relationships" xmlns:p="http://schemas.openxmlformats.org/presentationml/2006/main">
+  <p:cSld>
+    <p:spTree>
+      <p:nvGrpSpPr>
+        <p:cNvPr id="1" name=""/>
+        <p:cNvGrpSpPr/>
+        <p:nvPr/>
+      </p:nvGrpSpPr>
+      <p:grpSpPr>
+        <a:xfrm>
+          <a:off x="0" y="0"/>
+          <a:ext cx="0" cy="0"/>
+          <a:chOff x="0" y="0"/>
+          <a:chExt cx="0" cy="0"/>
+        </a:xfrm>
+      </p:grpSpPr>
+      <p:pic>
+        <p:nvPicPr>
+          <p:cNvPr id="6" name="Picture 2" descr="3D Character and Blank Board by catheryn.carcamo."/>
+          <p:cNvPicPr>
+            <a:picLocks noGrp="1" noChangeAspect="1" noChangeArrowheads="1"/>
+          </p:cNvPicPr>
+          <p:nvPr>
+            <p:ph idx="1"/>
+          </p:nvPr>
+        </p:nvPicPr>
+        <p:blipFill>
+          <a:blip r:embed="rId2">
+            <a:extLst>
+              <a:ext uri="{28A0092B-C50C-407E-A947-70E740481C1C}">
+                <a14:useLocalDpi xmlns:a14="http://schemas.microsoft.com/office/drawing/2010/main" val="0"/>
+              </a:ext>
+            </a:extLst>
+          </a:blip>
+          <a:srcRect l="-43786" r="-43786"/>
+          <a:stretch>
+            <a:fillRect/>
+          </a:stretch>
+        </p:blipFill>
+        <p:spPr bwMode="auto">
+          <a:xfrm>
+            <a:off x="457200" y="723900"/>
+            <a:ext cx="8229600" cy="5849938"/>
+          </a:xfrm>
+          <a:prstGeom prst="rect">
+            <a:avLst/>
+          </a:prstGeom>
+          <a:noFill/>
+          <a:ln>
+            <a:noFill/>
+          </a:ln>
+          <a:extLst>
+            <a:ext uri="{909E8E84-426E-40dd-AFC4-6F175D3DCCD1}">
+              <a14:hiddenFill xmlns:a14="http://schemas.microsoft.com/office/drawing/2010/main">
+                <a:solidFill>
+                  <a:srgbClr val="FFFFFF"/>
+                </a:solidFill>
+              </a14:hiddenFill>
+            </a:ext>
+            <a:ext uri="{91240B29-F687-4f45-9708-019B960494DF}">
+              <a14:hiddenLine xmlns:a14="http://schemas.microsoft.com/office/drawing/2010/main" w="9525">
+                <a:solidFill>
+                  <a:srgbClr val="000000"/>
+                </a:solidFill>
+                <a:miter lim="800000"/>
+                <a:headEnd/>
+                <a:tailEnd/>
+              </a14:hiddenLine>
+            </a:ext>
+          </a:extLst>
+        </p:spPr>
+      </p:pic>
+      <p:sp>
+        <p:nvSpPr>
+          <p:cNvPr id="7" name="Rectangle 6"/>
+          <p:cNvSpPr/>
+          <p:nvPr/>
+        </p:nvSpPr>
+        <p:spPr>
+          <a:xfrm rot="20572439">
+            <a:off x="3150493" y="2781161"/>
+            <a:ext cx="2748469" cy="830997"/>
+          </a:xfrm>
+          <a:prstGeom prst="rect">
+            <a:avLst/>
+          </a:prstGeom>
+        </p:spPr>
+        <p:txBody>
+          <a:bodyPr wrap="none">
+            <a:spAutoFit/>
+          </a:bodyPr>
+          <a:lstStyle/>
+          <a:p>
+            <a:pPr algn="ctr"/>
+            <a:r>
+              <a:rPr lang="pt-BR" sz="2400" b="1" dirty="0" smtClean="0">
+                <a:ln w="12700">
+                  <a:solidFill>
+                    <a:schemeClr val="tx2">
+                      <a:satMod val="155000"/>
+                    </a:schemeClr>
+                  </a:solidFill>
+                  <a:prstDash val="solid"/>
+                </a:ln>
+                <a:solidFill>
+                  <a:schemeClr val="bg2">
+                    <a:tint val="85000"/>
+                    <a:satMod val="155000"/>
+                  </a:schemeClr>
+                </a:solidFill>
+                <a:effectLst>
+                  <a:outerShdw blurRad="41275" dist="20320" dir="1800000" algn="tl" rotWithShape="0">
+                    <a:srgbClr val="000000">
+                      <a:alpha val="40000"/>
+                    </a:srgbClr>
+                  </a:outerShdw>
+                </a:effectLst>
+              </a:rPr>
+              <a:t>Fundamenta</a:t>
+            </a:r>
+            <a:r>
+              <a:rPr lang="pt-BR" sz="2400" b="1" dirty="0" smtClean="0">
+                <a:ln w="12700">
+                  <a:solidFill>
+                    <a:schemeClr val="tx2">
+                      <a:satMod val="155000"/>
+                    </a:schemeClr>
+                  </a:solidFill>
+                  <a:prstDash val="solid"/>
+                </a:ln>
+                <a:solidFill>
+                  <a:schemeClr val="bg2">
+                    <a:tint val="85000"/>
+                    <a:satMod val="155000"/>
+                  </a:schemeClr>
+                </a:solidFill>
+                <a:effectLst>
+                  <a:outerShdw blurRad="41275" dist="20320" dir="1800000" algn="tl" rotWithShape="0">
+                    <a:srgbClr val="000000">
+                      <a:alpha val="40000"/>
+                    </a:srgbClr>
+                  </a:outerShdw>
+                </a:effectLst>
+              </a:rPr>
+              <a:t>ção </a:t>
+            </a:r>
+          </a:p>
+          <a:p>
+            <a:pPr algn="ctr"/>
+            <a:r>
+              <a:rPr lang="pt-BR" sz="2400" b="1" dirty="0" smtClean="0">
+                <a:ln w="12700">
+                  <a:solidFill>
+                    <a:schemeClr val="tx2">
+                      <a:satMod val="155000"/>
+                    </a:schemeClr>
+                  </a:solidFill>
+                  <a:prstDash val="solid"/>
+                </a:ln>
+                <a:solidFill>
+                  <a:schemeClr val="bg2">
+                    <a:tint val="85000"/>
+                    <a:satMod val="155000"/>
+                  </a:schemeClr>
+                </a:solidFill>
+                <a:effectLst>
+                  <a:outerShdw blurRad="41275" dist="20320" dir="1800000" algn="tl" rotWithShape="0">
+                    <a:srgbClr val="000000">
+                      <a:alpha val="40000"/>
+                    </a:srgbClr>
+                  </a:outerShdw>
+                </a:effectLst>
+              </a:rPr>
+              <a:t>Teórica</a:t>
+            </a:r>
+            <a:endParaRPr lang="en-US" sz="2400" dirty="0"/>
+          </a:p>
+        </p:txBody>
+      </p:sp>
+    </p:spTree>
+    <p:extLst>
+      <p:ext uri="{BB962C8B-B14F-4D97-AF65-F5344CB8AC3E}">
+        <p14:creationId xmlns:p14="http://schemas.microsoft.com/office/powerpoint/2010/main" val="1141989532"/>
       </p:ext>
     </p:extLst>
   </p:cSld>

</xml_diff>